<commit_message>
delete chinese and add debug
</commit_message>
<xml_diff>
--- a/picture/画图.pptx
+++ b/picture/画图.pptx
@@ -6,7 +6,6 @@
   </p:sldMasterIdLst>
   <p:sldIdLst>
     <p:sldId id="259" r:id="rId3"/>
-    <p:sldId id="260" r:id="rId4"/>
   </p:sldIdLst>
   <p:sldSz cx="12192000" cy="6858000"/>
   <p:notesSz cx="6858000" cy="9144000"/>
@@ -4274,1656 +4273,7 @@
                 <a:rPr lang="en-US" altLang="zh-CN" b="1" dirty="0">
                   <a:sym typeface="+mn-ea"/>
                 </a:rPr>
-                <a:t>Step 5: Test Fixed Program</a:t>
-              </a:r>
-              <a:endParaRPr lang="en-US" altLang="zh-CN" b="1" dirty="0"/>
-            </a:p>
-          </p:txBody>
-        </p:sp>
-        <p:grpSp>
-          <p:nvGrpSpPr>
-            <p:cNvPr id="62" name="组合 61"/>
-            <p:cNvGrpSpPr/>
-            <p:nvPr/>
-          </p:nvGrpSpPr>
-          <p:grpSpPr>
-            <a:xfrm>
-              <a:off x="1574372" y="3523566"/>
-              <a:ext cx="1447743" cy="219197"/>
-              <a:chOff x="1766208" y="4745028"/>
-              <a:chExt cx="1447743" cy="219197"/>
-            </a:xfrm>
-            <a:grpFill/>
-          </p:grpSpPr>
-          <p:sp>
-            <p:nvSpPr>
-              <p:cNvPr id="7" name="矩形 6"/>
-              <p:cNvSpPr/>
-              <p:nvPr/>
-            </p:nvSpPr>
-            <p:spPr>
-              <a:xfrm>
-                <a:off x="2668158" y="4763949"/>
-                <a:ext cx="545793" cy="200276"/>
-              </a:xfrm>
-              <a:prstGeom prst="rect">
-                <a:avLst/>
-              </a:prstGeom>
-              <a:solidFill>
-                <a:schemeClr val="bg1"/>
-              </a:solidFill>
-              <a:ln>
-                <a:solidFill>
-                  <a:srgbClr val="5B9BD5"/>
-                </a:solidFill>
-              </a:ln>
-            </p:spPr>
-            <p:style>
-              <a:lnRef idx="2">
-                <a:schemeClr val="accent6"/>
-              </a:lnRef>
-              <a:fillRef idx="1">
-                <a:schemeClr val="lt1"/>
-              </a:fillRef>
-              <a:effectRef idx="0">
-                <a:schemeClr val="accent6"/>
-              </a:effectRef>
-              <a:fontRef idx="minor">
-                <a:schemeClr val="dk1"/>
-              </a:fontRef>
-            </p:style>
-            <p:txBody>
-              <a:bodyPr rtlCol="0" anchor="ctr"/>
-              <a:lstStyle/>
-              <a:p>
-                <a:pPr algn="ctr"/>
-                <a:r>
-                  <a:rPr lang="en-US" altLang="zh-CN" dirty="0">
-                    <a:ln w="0"/>
-                    <a:effectLst>
-                      <a:outerShdw blurRad="38100" dist="19050" dir="2700000" algn="tl" rotWithShape="0">
-                        <a:schemeClr val="dk1">
-                          <a:alpha val="40000"/>
-                        </a:schemeClr>
-                      </a:outerShdw>
-                    </a:effectLst>
-                  </a:rPr>
-                  <a:t>JPF</a:t>
-                </a:r>
-                <a:endParaRPr lang="en-US" altLang="zh-CN" dirty="0">
-                  <a:ln w="0"/>
-                  <a:effectLst>
-                    <a:outerShdw blurRad="38100" dist="19050" dir="2700000" algn="tl" rotWithShape="0">
-                      <a:schemeClr val="dk1">
-                        <a:alpha val="40000"/>
-                      </a:schemeClr>
-                    </a:outerShdw>
-                  </a:effectLst>
-                </a:endParaRPr>
-              </a:p>
-            </p:txBody>
-          </p:sp>
-          <p:sp>
-            <p:nvSpPr>
-              <p:cNvPr id="15" name="矩形 14"/>
-              <p:cNvSpPr/>
-              <p:nvPr/>
-            </p:nvSpPr>
-            <p:spPr>
-              <a:xfrm>
-                <a:off x="1766208" y="4745028"/>
-                <a:ext cx="766237" cy="219196"/>
-              </a:xfrm>
-              <a:prstGeom prst="rect">
-                <a:avLst/>
-              </a:prstGeom>
-              <a:solidFill>
-                <a:schemeClr val="bg1"/>
-              </a:solidFill>
-              <a:ln>
-                <a:solidFill>
-                  <a:srgbClr val="5B9BD5"/>
-                </a:solidFill>
-              </a:ln>
-            </p:spPr>
-            <p:style>
-              <a:lnRef idx="2">
-                <a:schemeClr val="accent6"/>
-              </a:lnRef>
-              <a:fillRef idx="1">
-                <a:schemeClr val="lt1"/>
-              </a:fillRef>
-              <a:effectRef idx="0">
-                <a:schemeClr val="accent6"/>
-              </a:effectRef>
-              <a:fontRef idx="minor">
-                <a:schemeClr val="dk1"/>
-              </a:fontRef>
-            </p:style>
-            <p:txBody>
-              <a:bodyPr rtlCol="0" anchor="ctr"/>
-              <a:lstStyle/>
-              <a:p>
-                <a:pPr algn="ctr"/>
-                <a:r>
-                  <a:rPr lang="en-US" altLang="zh-CN" dirty="0">
-                    <a:ln w="0"/>
-                    <a:effectLst>
-                      <a:outerShdw blurRad="38100" dist="19050" dir="2700000" algn="tl" rotWithShape="0">
-                        <a:schemeClr val="dk1">
-                          <a:alpha val="40000"/>
-                        </a:schemeClr>
-                      </a:outerShdw>
-                    </a:effectLst>
-                  </a:rPr>
-                  <a:t>Unicorn</a:t>
-                </a:r>
-                <a:endParaRPr lang="en-US" altLang="zh-CN" dirty="0">
-                  <a:ln w="0"/>
-                  <a:effectLst>
-                    <a:outerShdw blurRad="38100" dist="19050" dir="2700000" algn="tl" rotWithShape="0">
-                      <a:schemeClr val="dk1">
-                        <a:alpha val="40000"/>
-                      </a:schemeClr>
-                    </a:outerShdw>
-                  </a:effectLst>
-                </a:endParaRPr>
-              </a:p>
-            </p:txBody>
-          </p:sp>
-        </p:grpSp>
-      </p:grpSp>
-      <p:cxnSp>
-        <p:nvCxnSpPr>
-          <p:cNvPr id="31" name="直接箭头连接符 30"/>
-          <p:cNvCxnSpPr/>
-          <p:nvPr/>
-        </p:nvCxnSpPr>
-        <p:spPr>
-          <a:xfrm>
-            <a:off x="5757594" y="1420162"/>
-            <a:ext cx="1341105" cy="0"/>
-          </a:xfrm>
-          <a:prstGeom prst="straightConnector1">
-            <a:avLst/>
-          </a:prstGeom>
-          <a:ln w="38100" cmpd="sng">
-            <a:solidFill>
-              <a:schemeClr val="tx1"/>
-            </a:solidFill>
-            <a:prstDash val="solid"/>
-            <a:tailEnd type="arrow"/>
-          </a:ln>
-        </p:spPr>
-        <p:style>
-          <a:lnRef idx="1">
-            <a:schemeClr val="accent1"/>
-          </a:lnRef>
-          <a:fillRef idx="0">
-            <a:schemeClr val="accent1"/>
-          </a:fillRef>
-          <a:effectRef idx="0">
-            <a:schemeClr val="accent1"/>
-          </a:effectRef>
-          <a:fontRef idx="minor">
-            <a:schemeClr val="tx1"/>
-          </a:fontRef>
-        </p:style>
-      </p:cxnSp>
-      <p:cxnSp>
-        <p:nvCxnSpPr>
-          <p:cNvPr id="32" name="直接箭头连接符 31"/>
-          <p:cNvCxnSpPr>
-            <a:stCxn id="83" idx="2"/>
-          </p:cNvCxnSpPr>
-          <p:nvPr/>
-        </p:nvCxnSpPr>
-        <p:spPr>
-          <a:xfrm>
-            <a:off x="8937649" y="3775132"/>
-            <a:ext cx="0" cy="567655"/>
-          </a:xfrm>
-          <a:prstGeom prst="straightConnector1">
-            <a:avLst/>
-          </a:prstGeom>
-          <a:ln w="38100" cmpd="sng">
-            <a:solidFill>
-              <a:schemeClr val="tx1"/>
-            </a:solidFill>
-            <a:prstDash val="solid"/>
-            <a:tailEnd type="arrow"/>
-          </a:ln>
-        </p:spPr>
-        <p:style>
-          <a:lnRef idx="1">
-            <a:schemeClr val="accent1"/>
-          </a:lnRef>
-          <a:fillRef idx="0">
-            <a:schemeClr val="accent1"/>
-          </a:fillRef>
-          <a:effectRef idx="0">
-            <a:schemeClr val="accent1"/>
-          </a:effectRef>
-          <a:fontRef idx="minor">
-            <a:schemeClr val="tx1"/>
-          </a:fontRef>
-        </p:style>
-      </p:cxnSp>
-      <p:cxnSp>
-        <p:nvCxnSpPr>
-          <p:cNvPr id="18" name="直接箭头连接符 17"/>
-          <p:cNvCxnSpPr/>
-          <p:nvPr/>
-        </p:nvCxnSpPr>
-        <p:spPr>
-          <a:xfrm flipH="1">
-            <a:off x="4652010" y="5113020"/>
-            <a:ext cx="1440011" cy="3175"/>
-          </a:xfrm>
-          <a:prstGeom prst="straightConnector1">
-            <a:avLst/>
-          </a:prstGeom>
-          <a:ln w="38100" cmpd="sng">
-            <a:solidFill>
-              <a:schemeClr val="tx1"/>
-            </a:solidFill>
-            <a:prstDash val="solid"/>
-            <a:tailEnd type="arrow"/>
-          </a:ln>
-        </p:spPr>
-        <p:style>
-          <a:lnRef idx="1">
-            <a:schemeClr val="accent1"/>
-          </a:lnRef>
-          <a:fillRef idx="0">
-            <a:schemeClr val="accent1"/>
-          </a:fillRef>
-          <a:effectRef idx="0">
-            <a:schemeClr val="accent1"/>
-          </a:effectRef>
-          <a:fontRef idx="minor">
-            <a:schemeClr val="tx1"/>
-          </a:fontRef>
-        </p:style>
-      </p:cxnSp>
-    </p:spTree>
-  </p:cSld>
-  <p:clrMapOvr>
-    <a:masterClrMapping/>
-  </p:clrMapOvr>
-</p:sld>
-</file>
-
-<file path=ppt/slides/slide2.xml><?xml version="1.0" encoding="utf-8"?>
-<p:sld xmlns:a="http://schemas.openxmlformats.org/drawingml/2006/main" xmlns:r="http://schemas.openxmlformats.org/officeDocument/2006/relationships" xmlns:p="http://schemas.openxmlformats.org/presentationml/2006/main">
-  <p:cSld>
-    <p:bg>
-      <p:bgPr>
-        <a:solidFill>
-          <a:schemeClr val="bg1"/>
-        </a:solidFill>
-        <a:effectLst/>
-      </p:bgPr>
-    </p:bg>
-    <p:spTree>
-      <p:nvGrpSpPr>
-        <p:cNvPr id="1" name=""/>
-        <p:cNvGrpSpPr/>
-        <p:nvPr/>
-      </p:nvGrpSpPr>
-      <p:grpSpPr>
-        <a:xfrm>
-          <a:off x="0" y="0"/>
-          <a:ext cx="0" cy="0"/>
-          <a:chOff x="0" y="0"/>
-          <a:chExt cx="0" cy="0"/>
-        </a:xfrm>
-      </p:grpSpPr>
-      <p:sp>
-        <p:nvSpPr>
-          <p:cNvPr id="45" name="流程图: 可选过程 44"/>
-          <p:cNvSpPr/>
-          <p:nvPr/>
-        </p:nvSpPr>
-        <p:spPr>
-          <a:xfrm>
-            <a:off x="1470519" y="808769"/>
-            <a:ext cx="4240023" cy="2993995"/>
-          </a:xfrm>
-          <a:prstGeom prst="flowChartAlternateProcess">
-            <a:avLst/>
-          </a:prstGeom>
-          <a:solidFill>
-            <a:schemeClr val="accent6">
-              <a:lumMod val="20000"/>
-              <a:lumOff val="80000"/>
-            </a:schemeClr>
-          </a:solidFill>
-          <a:ln>
-            <a:solidFill>
-              <a:schemeClr val="accent1"/>
-            </a:solidFill>
-            <a:prstDash val="solid"/>
-          </a:ln>
-        </p:spPr>
-        <p:style>
-          <a:lnRef idx="2">
-            <a:schemeClr val="accent6"/>
-          </a:lnRef>
-          <a:fillRef idx="1">
-            <a:schemeClr val="lt1"/>
-          </a:fillRef>
-          <a:effectRef idx="0">
-            <a:schemeClr val="accent6"/>
-          </a:effectRef>
-          <a:fontRef idx="minor">
-            <a:schemeClr val="dk1"/>
-          </a:fontRef>
-        </p:style>
-        <p:txBody>
-          <a:bodyPr rtlCol="0" anchor="ctr"/>
-          <a:lstStyle/>
-          <a:p>
-            <a:pPr algn="ctr"/>
-            <a:br>
-              <a:rPr lang="en-US" altLang="zh-CN" b="1" dirty="0"/>
-            </a:br>
-            <a:br>
-              <a:rPr lang="en-US" altLang="zh-CN" b="1" dirty="0"/>
-            </a:br>
-            <a:br>
-              <a:rPr lang="en-US" altLang="zh-CN" b="1" dirty="0"/>
-            </a:br>
-            <a:br>
-              <a:rPr lang="en-US" altLang="zh-CN" b="1" dirty="0"/>
-            </a:br>
-            <a:br>
-              <a:rPr lang="en-US" altLang="zh-CN" b="1" dirty="0"/>
-            </a:br>
-            <a:br>
-              <a:rPr lang="en-US" altLang="zh-CN" b="1" dirty="0"/>
-            </a:br>
-            <a:endParaRPr lang="en-US" altLang="zh-CN" b="1" dirty="0"/>
-          </a:p>
-          <a:p>
-            <a:pPr algn="ctr"/>
-            <a:endParaRPr lang="en-US" altLang="zh-CN" b="1" dirty="0"/>
-          </a:p>
-          <a:p>
-            <a:pPr algn="ctr"/>
-            <a:r>
-              <a:rPr lang="en-US" altLang="zh-CN" b="1" dirty="0"/>
-              <a:t>Step 1: Identify Memory Access Pattern</a:t>
-            </a:r>
-            <a:endParaRPr lang="en-US" altLang="zh-CN" b="1" dirty="0"/>
-          </a:p>
-        </p:txBody>
-      </p:sp>
-      <p:sp>
-        <p:nvSpPr>
-          <p:cNvPr id="46" name="流程图: 可选过程 45"/>
-          <p:cNvSpPr/>
-          <p:nvPr/>
-        </p:nvSpPr>
-        <p:spPr>
-          <a:xfrm>
-            <a:off x="2345557" y="1062034"/>
-            <a:ext cx="2477275" cy="536696"/>
-          </a:xfrm>
-          <a:prstGeom prst="flowChartAlternateProcess">
-            <a:avLst/>
-          </a:prstGeom>
-          <a:solidFill>
-            <a:schemeClr val="accent4">
-              <a:lumMod val="20000"/>
-              <a:lumOff val="80000"/>
-            </a:schemeClr>
-          </a:solidFill>
-        </p:spPr>
-        <p:style>
-          <a:lnRef idx="2">
-            <a:schemeClr val="accent6"/>
-          </a:lnRef>
-          <a:fillRef idx="1">
-            <a:schemeClr val="lt1"/>
-          </a:fillRef>
-          <a:effectRef idx="0">
-            <a:schemeClr val="accent6"/>
-          </a:effectRef>
-          <a:fontRef idx="minor">
-            <a:schemeClr val="dk1"/>
-          </a:fontRef>
-        </p:style>
-        <p:txBody>
-          <a:bodyPr rtlCol="0" anchor="ctr"/>
-          <a:lstStyle/>
-          <a:p>
-            <a:pPr algn="ctr"/>
-            <a:r>
-              <a:rPr lang="en-US" altLang="zh-CN" dirty="0"/>
-              <a:t>Identify Pattern</a:t>
-            </a:r>
-            <a:endParaRPr lang="zh-CN" altLang="en-US" dirty="0"/>
-          </a:p>
-        </p:txBody>
-      </p:sp>
-      <p:sp>
-        <p:nvSpPr>
-          <p:cNvPr id="48" name="流程图: 可选过程 47"/>
-          <p:cNvSpPr/>
-          <p:nvPr/>
-        </p:nvSpPr>
-        <p:spPr>
-          <a:xfrm>
-            <a:off x="1992213" y="2018121"/>
-            <a:ext cx="3188657" cy="944053"/>
-          </a:xfrm>
-          <a:prstGeom prst="flowChartAlternateProcess">
-            <a:avLst/>
-          </a:prstGeom>
-          <a:solidFill>
-            <a:schemeClr val="accent4">
-              <a:lumMod val="20000"/>
-              <a:lumOff val="80000"/>
-            </a:schemeClr>
-          </a:solidFill>
-        </p:spPr>
-        <p:style>
-          <a:lnRef idx="2">
-            <a:schemeClr val="accent6"/>
-          </a:lnRef>
-          <a:fillRef idx="1">
-            <a:schemeClr val="lt1"/>
-          </a:fillRef>
-          <a:effectRef idx="0">
-            <a:schemeClr val="accent6"/>
-          </a:effectRef>
-          <a:fontRef idx="minor">
-            <a:schemeClr val="dk1"/>
-          </a:fontRef>
-        </p:style>
-        <p:txBody>
-          <a:bodyPr rtlCol="0" anchor="ctr"/>
-          <a:lstStyle/>
-          <a:p>
-            <a:pPr algn="ctr"/>
-            <a:br>
-              <a:rPr lang="en-US" altLang="zh-CN" dirty="0"/>
-            </a:br>
-            <a:br>
-              <a:rPr lang="en-US" altLang="zh-CN" dirty="0"/>
-            </a:br>
-            <a:r>
-              <a:rPr lang="en-US" altLang="zh-CN" dirty="0"/>
-              <a:t>Obtain pattern list</a:t>
-            </a:r>
-            <a:endParaRPr lang="en-US" altLang="zh-CN" dirty="0"/>
-          </a:p>
-        </p:txBody>
-      </p:sp>
-      <p:sp>
-        <p:nvSpPr>
-          <p:cNvPr id="49" name="矩形 48"/>
-          <p:cNvSpPr/>
-          <p:nvPr/>
-        </p:nvSpPr>
-        <p:spPr>
-          <a:xfrm>
-            <a:off x="2550116" y="2115949"/>
-            <a:ext cx="728598" cy="374198"/>
-          </a:xfrm>
-          <a:prstGeom prst="rect">
-            <a:avLst/>
-          </a:prstGeom>
-          <a:ln>
-            <a:solidFill>
-              <a:schemeClr val="tx1"/>
-            </a:solidFill>
-          </a:ln>
-        </p:spPr>
-        <p:style>
-          <a:lnRef idx="2">
-            <a:schemeClr val="accent6"/>
-          </a:lnRef>
-          <a:fillRef idx="1">
-            <a:schemeClr val="lt1"/>
-          </a:fillRef>
-          <a:effectRef idx="0">
-            <a:schemeClr val="accent6"/>
-          </a:effectRef>
-          <a:fontRef idx="minor">
-            <a:schemeClr val="dk1"/>
-          </a:fontRef>
-        </p:style>
-        <p:txBody>
-          <a:bodyPr rtlCol="0" anchor="ctr"/>
-          <a:lstStyle/>
-          <a:p>
-            <a:pPr algn="ctr"/>
-            <a:r>
-              <a:rPr lang="en-US" altLang="zh-CN" dirty="0">
-                <a:ln w="0"/>
-                <a:effectLst>
-                  <a:outerShdw blurRad="38100" dist="19050" dir="2700000" algn="tl" rotWithShape="0">
-                    <a:schemeClr val="dk1">
-                      <a:alpha val="40000"/>
-                    </a:schemeClr>
-                  </a:outerShdw>
-                </a:effectLst>
-              </a:rPr>
-              <a:t>JPF</a:t>
-            </a:r>
-            <a:endParaRPr lang="en-US" altLang="zh-CN" dirty="0">
-              <a:ln w="0"/>
-              <a:effectLst>
-                <a:outerShdw blurRad="38100" dist="19050" dir="2700000" algn="tl" rotWithShape="0">
-                  <a:schemeClr val="dk1">
-                    <a:alpha val="40000"/>
-                  </a:schemeClr>
-                </a:outerShdw>
-              </a:effectLst>
-            </a:endParaRPr>
-          </a:p>
-        </p:txBody>
-      </p:sp>
-      <p:sp>
-        <p:nvSpPr>
-          <p:cNvPr id="51" name="矩形 50"/>
-          <p:cNvSpPr/>
-          <p:nvPr/>
-        </p:nvSpPr>
-        <p:spPr>
-          <a:xfrm>
-            <a:off x="3543261" y="2093972"/>
-            <a:ext cx="1117262" cy="387210"/>
-          </a:xfrm>
-          <a:prstGeom prst="rect">
-            <a:avLst/>
-          </a:prstGeom>
-          <a:ln>
-            <a:solidFill>
-              <a:schemeClr val="tx1"/>
-            </a:solidFill>
-          </a:ln>
-        </p:spPr>
-        <p:style>
-          <a:lnRef idx="2">
-            <a:schemeClr val="accent6"/>
-          </a:lnRef>
-          <a:fillRef idx="1">
-            <a:schemeClr val="lt1"/>
-          </a:fillRef>
-          <a:effectRef idx="0">
-            <a:schemeClr val="accent6"/>
-          </a:effectRef>
-          <a:fontRef idx="minor">
-            <a:schemeClr val="dk1"/>
-          </a:fontRef>
-        </p:style>
-        <p:txBody>
-          <a:bodyPr rtlCol="0" anchor="ctr"/>
-          <a:lstStyle/>
-          <a:p>
-            <a:pPr algn="ctr"/>
-            <a:r>
-              <a:rPr lang="en-US" altLang="zh-CN" dirty="0">
-                <a:ln w="0"/>
-                <a:effectLst>
-                  <a:outerShdw blurRad="38100" dist="19050" dir="2700000" algn="tl" rotWithShape="0">
-                    <a:schemeClr val="dk1">
-                      <a:alpha val="40000"/>
-                    </a:schemeClr>
-                  </a:outerShdw>
-                </a:effectLst>
-              </a:rPr>
-              <a:t>Unicorn</a:t>
-            </a:r>
-            <a:endParaRPr lang="en-US" altLang="zh-CN" dirty="0">
-              <a:ln w="0"/>
-              <a:effectLst>
-                <a:outerShdw blurRad="38100" dist="19050" dir="2700000" algn="tl" rotWithShape="0">
-                  <a:schemeClr val="dk1">
-                    <a:alpha val="40000"/>
-                  </a:schemeClr>
-                </a:outerShdw>
-              </a:effectLst>
-            </a:endParaRPr>
-          </a:p>
-        </p:txBody>
-      </p:sp>
-      <p:cxnSp>
-        <p:nvCxnSpPr>
-          <p:cNvPr id="69" name="直接箭头连接符 68"/>
-          <p:cNvCxnSpPr>
-            <a:stCxn id="48" idx="0"/>
-            <a:endCxn id="46" idx="2"/>
-          </p:cNvCxnSpPr>
-          <p:nvPr/>
-        </p:nvCxnSpPr>
-        <p:spPr>
-          <a:xfrm flipH="1" flipV="1">
-            <a:off x="3584196" y="1598731"/>
-            <a:ext cx="2346" cy="419390"/>
-          </a:xfrm>
-          <a:prstGeom prst="straightConnector1">
-            <a:avLst/>
-          </a:prstGeom>
-          <a:ln w="19050" cmpd="sng">
-            <a:solidFill>
-              <a:schemeClr val="tx1"/>
-            </a:solidFill>
-            <a:prstDash val="solid"/>
-            <a:tailEnd type="arrow"/>
-          </a:ln>
-        </p:spPr>
-        <p:style>
-          <a:lnRef idx="1">
-            <a:schemeClr val="accent1"/>
-          </a:lnRef>
-          <a:fillRef idx="0">
-            <a:schemeClr val="accent1"/>
-          </a:fillRef>
-          <a:effectRef idx="0">
-            <a:schemeClr val="accent1"/>
-          </a:effectRef>
-          <a:fontRef idx="minor">
-            <a:schemeClr val="tx1"/>
-          </a:fontRef>
-        </p:style>
-      </p:cxnSp>
-      <p:sp>
-        <p:nvSpPr>
-          <p:cNvPr id="73" name="流程图: 可选过程 72"/>
-          <p:cNvSpPr/>
-          <p:nvPr/>
-        </p:nvSpPr>
-        <p:spPr>
-          <a:xfrm>
-            <a:off x="7098699" y="815991"/>
-            <a:ext cx="3677221" cy="1208341"/>
-          </a:xfrm>
-          <a:prstGeom prst="flowChartAlternateProcess">
-            <a:avLst/>
-          </a:prstGeom>
-          <a:solidFill>
-            <a:schemeClr val="accent6">
-              <a:lumMod val="20000"/>
-              <a:lumOff val="80000"/>
-            </a:schemeClr>
-          </a:solidFill>
-          <a:ln w="3175">
-            <a:solidFill>
-              <a:schemeClr val="accent1"/>
-            </a:solidFill>
-            <a:prstDash val="solid"/>
-          </a:ln>
-        </p:spPr>
-        <p:style>
-          <a:lnRef idx="2">
-            <a:schemeClr val="accent6"/>
-          </a:lnRef>
-          <a:fillRef idx="1">
-            <a:schemeClr val="lt1"/>
-          </a:fillRef>
-          <a:effectRef idx="0">
-            <a:schemeClr val="accent6"/>
-          </a:effectRef>
-          <a:fontRef idx="minor">
-            <a:schemeClr val="dk1"/>
-          </a:fontRef>
-        </p:style>
-        <p:txBody>
-          <a:bodyPr rtlCol="0" anchor="ctr"/>
-          <a:lstStyle/>
-          <a:p>
-            <a:pPr algn="ctr"/>
-            <a:br>
-              <a:rPr lang="en-US" altLang="zh-CN" b="1" dirty="0"/>
-            </a:br>
-            <a:br>
-              <a:rPr lang="en-US" altLang="zh-CN" b="1" dirty="0"/>
-            </a:br>
-            <a:r>
-              <a:rPr lang="en-US" altLang="zh-CN" b="1" dirty="0"/>
-              <a:t>Step 2: </a:t>
-            </a:r>
-            <a:r>
-              <a:rPr lang="en-US" altLang="zh-CN" b="1" dirty="0">
-                <a:sym typeface="+mn-ea"/>
-              </a:rPr>
-              <a:t>Identify Locking Policy</a:t>
-            </a:r>
-            <a:endParaRPr lang="en-US" altLang="zh-CN" b="1" dirty="0"/>
-          </a:p>
-        </p:txBody>
-      </p:sp>
-      <p:sp>
-        <p:nvSpPr>
-          <p:cNvPr id="144" name="流程图: 可选过程 143"/>
-          <p:cNvSpPr/>
-          <p:nvPr/>
-        </p:nvSpPr>
-        <p:spPr>
-          <a:xfrm>
-            <a:off x="6144895" y="4353560"/>
-            <a:ext cx="4631055" cy="1591310"/>
-          </a:xfrm>
-          <a:prstGeom prst="flowChartAlternateProcess">
-            <a:avLst/>
-          </a:prstGeom>
-          <a:solidFill>
-            <a:schemeClr val="accent6">
-              <a:lumMod val="20000"/>
-              <a:lumOff val="80000"/>
-            </a:schemeClr>
-          </a:solidFill>
-          <a:ln>
-            <a:solidFill>
-              <a:schemeClr val="accent1"/>
-            </a:solidFill>
-            <a:prstDash val="solid"/>
-          </a:ln>
-        </p:spPr>
-        <p:style>
-          <a:lnRef idx="2">
-            <a:schemeClr val="accent6"/>
-          </a:lnRef>
-          <a:fillRef idx="1">
-            <a:schemeClr val="lt1"/>
-          </a:fillRef>
-          <a:effectRef idx="0">
-            <a:schemeClr val="accent6"/>
-          </a:effectRef>
-          <a:fontRef idx="minor">
-            <a:schemeClr val="dk1"/>
-          </a:fontRef>
-        </p:style>
-        <p:txBody>
-          <a:bodyPr rtlCol="0" anchor="ctr"/>
-          <a:lstStyle/>
-          <a:p>
-            <a:pPr algn="ctr"/>
-            <a:endParaRPr lang="en-US" altLang="zh-CN" b="1" dirty="0"/>
-          </a:p>
-          <a:p>
-            <a:pPr algn="ctr"/>
-            <a:endParaRPr lang="en-US" altLang="zh-CN" b="1" dirty="0"/>
-          </a:p>
-          <a:p>
-            <a:pPr algn="ctr"/>
-            <a:endParaRPr lang="en-US" altLang="zh-CN" b="1" dirty="0"/>
-          </a:p>
-          <a:p>
-            <a:pPr algn="ctr"/>
-            <a:endParaRPr lang="en-US" altLang="zh-CN" b="1" dirty="0"/>
-          </a:p>
-          <a:p>
-            <a:pPr algn="ctr"/>
-            <a:r>
-              <a:rPr lang="en-US" altLang="zh-CN" b="1" dirty="0"/>
-              <a:t>Step 4: Fix the Fixed Program</a:t>
-            </a:r>
-            <a:endParaRPr lang="en-US" altLang="zh-CN" b="1" dirty="0"/>
-          </a:p>
-        </p:txBody>
-      </p:sp>
-      <p:cxnSp>
-        <p:nvCxnSpPr>
-          <p:cNvPr id="166" name="直接箭头连接符 165"/>
-          <p:cNvCxnSpPr/>
-          <p:nvPr/>
-        </p:nvCxnSpPr>
-        <p:spPr>
-          <a:xfrm>
-            <a:off x="8936990" y="2024380"/>
-            <a:ext cx="7620" cy="578485"/>
-          </a:xfrm>
-          <a:prstGeom prst="straightConnector1">
-            <a:avLst/>
-          </a:prstGeom>
-          <a:ln w="38100" cmpd="sng">
-            <a:solidFill>
-              <a:schemeClr val="tx1"/>
-            </a:solidFill>
-            <a:prstDash val="solid"/>
-            <a:tailEnd type="arrow"/>
-          </a:ln>
-        </p:spPr>
-        <p:style>
-          <a:lnRef idx="1">
-            <a:schemeClr val="accent1"/>
-          </a:lnRef>
-          <a:fillRef idx="0">
-            <a:schemeClr val="accent1"/>
-          </a:fillRef>
-          <a:effectRef idx="0">
-            <a:schemeClr val="accent1"/>
-          </a:effectRef>
-          <a:fontRef idx="minor">
-            <a:schemeClr val="tx1"/>
-          </a:fontRef>
-        </p:style>
-      </p:cxnSp>
-      <p:cxnSp>
-        <p:nvCxnSpPr>
-          <p:cNvPr id="171" name="直接箭头连接符 170"/>
-          <p:cNvCxnSpPr/>
-          <p:nvPr/>
-        </p:nvCxnSpPr>
-        <p:spPr>
-          <a:xfrm>
-            <a:off x="3132455" y="3803015"/>
-            <a:ext cx="0" cy="748665"/>
-          </a:xfrm>
-          <a:prstGeom prst="straightConnector1">
-            <a:avLst/>
-          </a:prstGeom>
-          <a:ln w="38100" cmpd="sng">
-            <a:solidFill>
-              <a:schemeClr val="tx1"/>
-            </a:solidFill>
-            <a:prstDash val="solid"/>
-            <a:headEnd type="arrow"/>
-            <a:tailEnd type="none"/>
-          </a:ln>
-        </p:spPr>
-        <p:style>
-          <a:lnRef idx="1">
-            <a:schemeClr val="accent1"/>
-          </a:lnRef>
-          <a:fillRef idx="0">
-            <a:schemeClr val="accent1"/>
-          </a:fillRef>
-          <a:effectRef idx="0">
-            <a:schemeClr val="accent1"/>
-          </a:effectRef>
-          <a:fontRef idx="minor">
-            <a:schemeClr val="tx1"/>
-          </a:fontRef>
-        </p:style>
-      </p:cxnSp>
-      <p:cxnSp>
-        <p:nvCxnSpPr>
-          <p:cNvPr id="172" name="直接箭头连接符 171"/>
-          <p:cNvCxnSpPr>
-            <a:stCxn id="145" idx="3"/>
-            <a:endCxn id="152" idx="1"/>
-          </p:cNvCxnSpPr>
-          <p:nvPr/>
-        </p:nvCxnSpPr>
-        <p:spPr>
-          <a:xfrm>
-            <a:off x="8618220" y="4986655"/>
-            <a:ext cx="332105" cy="3175"/>
-          </a:xfrm>
-          <a:prstGeom prst="straightConnector1">
-            <a:avLst/>
-          </a:prstGeom>
-          <a:ln w="19050" cmpd="sng">
-            <a:solidFill>
-              <a:schemeClr val="tx1"/>
-            </a:solidFill>
-            <a:prstDash val="solid"/>
-            <a:tailEnd type="arrow"/>
-          </a:ln>
-        </p:spPr>
-        <p:style>
-          <a:lnRef idx="1">
-            <a:schemeClr val="accent1"/>
-          </a:lnRef>
-          <a:fillRef idx="0">
-            <a:schemeClr val="accent1"/>
-          </a:fillRef>
-          <a:effectRef idx="0">
-            <a:schemeClr val="accent1"/>
-          </a:effectRef>
-          <a:fontRef idx="minor">
-            <a:schemeClr val="tx1"/>
-          </a:fontRef>
-        </p:style>
-      </p:cxnSp>
-      <p:sp>
-        <p:nvSpPr>
-          <p:cNvPr id="9" name="矩形 8"/>
-          <p:cNvSpPr/>
-          <p:nvPr/>
-        </p:nvSpPr>
-        <p:spPr>
-          <a:xfrm>
-            <a:off x="7775197" y="982701"/>
-            <a:ext cx="1006528" cy="339310"/>
-          </a:xfrm>
-          <a:prstGeom prst="rect">
-            <a:avLst/>
-          </a:prstGeom>
-          <a:ln>
-            <a:solidFill>
-              <a:schemeClr val="tx1"/>
-            </a:solidFill>
-          </a:ln>
-        </p:spPr>
-        <p:style>
-          <a:lnRef idx="2">
-            <a:schemeClr val="accent6"/>
-          </a:lnRef>
-          <a:fillRef idx="1">
-            <a:schemeClr val="lt1"/>
-          </a:fillRef>
-          <a:effectRef idx="0">
-            <a:schemeClr val="accent6"/>
-          </a:effectRef>
-          <a:fontRef idx="minor">
-            <a:schemeClr val="dk1"/>
-          </a:fontRef>
-        </p:style>
-        <p:txBody>
-          <a:bodyPr rtlCol="0" anchor="ctr"/>
-          <a:lstStyle/>
-          <a:p>
-            <a:pPr algn="ctr"/>
-            <a:r>
-              <a:rPr lang="en-US" altLang="zh-CN" dirty="0">
-                <a:ln w="0"/>
-                <a:effectLst>
-                  <a:outerShdw blurRad="38100" dist="19050" dir="2700000" algn="tl" rotWithShape="0">
-                    <a:schemeClr val="dk1">
-                      <a:alpha val="40000"/>
-                    </a:schemeClr>
-                  </a:outerShdw>
-                </a:effectLst>
-              </a:rPr>
-              <a:t>JPF</a:t>
-            </a:r>
-            <a:endParaRPr lang="en-US" altLang="zh-CN" dirty="0">
-              <a:ln w="0"/>
-              <a:effectLst>
-                <a:outerShdw blurRad="38100" dist="19050" dir="2700000" algn="tl" rotWithShape="0">
-                  <a:schemeClr val="dk1">
-                    <a:alpha val="40000"/>
-                  </a:schemeClr>
-                </a:outerShdw>
-              </a:effectLst>
-            </a:endParaRPr>
-          </a:p>
-        </p:txBody>
-      </p:sp>
-      <p:sp>
-        <p:nvSpPr>
-          <p:cNvPr id="13" name="矩形 12"/>
-          <p:cNvSpPr/>
-          <p:nvPr/>
-        </p:nvSpPr>
-        <p:spPr>
-          <a:xfrm>
-            <a:off x="9115388" y="986788"/>
-            <a:ext cx="1174551" cy="339310"/>
-          </a:xfrm>
-          <a:prstGeom prst="rect">
-            <a:avLst/>
-          </a:prstGeom>
-          <a:ln>
-            <a:solidFill>
-              <a:schemeClr val="tx1"/>
-            </a:solidFill>
-          </a:ln>
-        </p:spPr>
-        <p:style>
-          <a:lnRef idx="2">
-            <a:schemeClr val="accent6"/>
-          </a:lnRef>
-          <a:fillRef idx="1">
-            <a:schemeClr val="lt1"/>
-          </a:fillRef>
-          <a:effectRef idx="0">
-            <a:schemeClr val="accent6"/>
-          </a:effectRef>
-          <a:fontRef idx="minor">
-            <a:schemeClr val="dk1"/>
-          </a:fontRef>
-        </p:style>
-        <p:txBody>
-          <a:bodyPr rtlCol="0" anchor="ctr"/>
-          <a:lstStyle/>
-          <a:p>
-            <a:pPr algn="ctr"/>
-            <a:r>
-              <a:rPr lang="en-US" altLang="zh-CN" dirty="0">
-                <a:ln w="0"/>
-                <a:effectLst>
-                  <a:outerShdw blurRad="38100" dist="19050" dir="2700000" algn="tl" rotWithShape="0">
-                    <a:schemeClr val="dk1">
-                      <a:alpha val="40000"/>
-                    </a:schemeClr>
-                  </a:outerShdw>
-                </a:effectLst>
-              </a:rPr>
-              <a:t>Unicorn</a:t>
-            </a:r>
-            <a:endParaRPr lang="en-US" altLang="zh-CN" dirty="0">
-              <a:ln w="0"/>
-              <a:effectLst>
-                <a:outerShdw blurRad="38100" dist="19050" dir="2700000" algn="tl" rotWithShape="0">
-                  <a:schemeClr val="dk1">
-                    <a:alpha val="40000"/>
-                  </a:schemeClr>
-                </a:outerShdw>
-              </a:effectLst>
-            </a:endParaRPr>
-          </a:p>
-        </p:txBody>
-      </p:sp>
-      <p:grpSp>
-        <p:nvGrpSpPr>
-          <p:cNvPr id="119" name="组合 118"/>
-          <p:cNvGrpSpPr/>
-          <p:nvPr/>
-        </p:nvGrpSpPr>
-        <p:grpSpPr>
-          <a:xfrm>
-            <a:off x="7098665" y="2602865"/>
-            <a:ext cx="3677285" cy="1172210"/>
-            <a:chOff x="5325563" y="1802328"/>
-            <a:chExt cx="2466750" cy="811388"/>
-          </a:xfrm>
-        </p:grpSpPr>
-        <p:sp>
-          <p:nvSpPr>
-            <p:cNvPr id="83" name="流程图: 可选过程 82"/>
-            <p:cNvSpPr/>
-            <p:nvPr/>
-          </p:nvSpPr>
-          <p:spPr>
-            <a:xfrm>
-              <a:off x="5325563" y="1802328"/>
-              <a:ext cx="2466750" cy="811388"/>
-            </a:xfrm>
-            <a:prstGeom prst="flowChartAlternateProcess">
-              <a:avLst/>
-            </a:prstGeom>
-            <a:solidFill>
-              <a:schemeClr val="accent6">
-                <a:lumMod val="20000"/>
-                <a:lumOff val="80000"/>
-              </a:schemeClr>
-            </a:solidFill>
-            <a:ln>
-              <a:solidFill>
-                <a:schemeClr val="accent1"/>
-              </a:solidFill>
-              <a:prstDash val="solid"/>
-            </a:ln>
-          </p:spPr>
-          <p:style>
-            <a:lnRef idx="2">
-              <a:schemeClr val="accent6"/>
-            </a:lnRef>
-            <a:fillRef idx="1">
-              <a:schemeClr val="lt1"/>
-            </a:fillRef>
-            <a:effectRef idx="0">
-              <a:schemeClr val="accent6"/>
-            </a:effectRef>
-            <a:fontRef idx="minor">
-              <a:schemeClr val="dk1"/>
-            </a:fontRef>
-          </p:style>
-          <p:txBody>
-            <a:bodyPr rtlCol="0" anchor="ctr"/>
-            <a:lstStyle/>
-            <a:p>
-              <a:pPr algn="ctr"/>
-              <a:br>
-                <a:rPr lang="en-US" altLang="zh-CN" b="1" dirty="0"/>
-              </a:br>
-              <a:br>
-                <a:rPr lang="en-US" altLang="zh-CN" b="1" dirty="0"/>
-              </a:br>
-              <a:r>
-                <a:rPr lang="en-US" altLang="zh-CN" b="1" dirty="0"/>
-                <a:t>Step 3: </a:t>
-              </a:r>
-              <a:r>
-                <a:rPr lang="en-US" altLang="zh-CN" b="1" dirty="0">
-                  <a:sym typeface="+mn-ea"/>
-                </a:rPr>
-                <a:t>Fix Bugs</a:t>
-              </a:r>
-              <a:endParaRPr lang="en-US" altLang="zh-CN" b="1" dirty="0"/>
-            </a:p>
-          </p:txBody>
-        </p:sp>
-        <p:sp>
-          <p:nvSpPr>
-            <p:cNvPr id="85" name="矩形 84"/>
-            <p:cNvSpPr/>
-            <p:nvPr/>
-          </p:nvSpPr>
-          <p:spPr>
-            <a:xfrm>
-              <a:off x="5727107" y="1902947"/>
-              <a:ext cx="733799" cy="239252"/>
-            </a:xfrm>
-            <a:prstGeom prst="rect">
-              <a:avLst/>
-            </a:prstGeom>
-            <a:ln>
-              <a:solidFill>
-                <a:schemeClr val="tx1"/>
-              </a:solidFill>
-              <a:prstDash val="solid"/>
-            </a:ln>
-          </p:spPr>
-          <p:style>
-            <a:lnRef idx="2">
-              <a:schemeClr val="accent6"/>
-            </a:lnRef>
-            <a:fillRef idx="1">
-              <a:schemeClr val="lt1"/>
-            </a:fillRef>
-            <a:effectRef idx="0">
-              <a:schemeClr val="accent6"/>
-            </a:effectRef>
-            <a:fontRef idx="minor">
-              <a:schemeClr val="dk1"/>
-            </a:fontRef>
-          </p:style>
-          <p:txBody>
-            <a:bodyPr rtlCol="0" anchor="ctr"/>
-            <a:lstStyle/>
-            <a:p>
-              <a:pPr algn="ctr"/>
-              <a:r>
-                <a:rPr lang="en-US" altLang="zh-CN" dirty="0"/>
-                <a:t>Soot</a:t>
-              </a:r>
-              <a:endParaRPr lang="zh-CN" altLang="en-US" dirty="0"/>
-            </a:p>
-          </p:txBody>
-        </p:sp>
-        <p:sp>
-          <p:nvSpPr>
-            <p:cNvPr id="19" name="矩形 18"/>
-            <p:cNvSpPr/>
-            <p:nvPr/>
-          </p:nvSpPr>
-          <p:spPr>
-            <a:xfrm>
-              <a:off x="6771086" y="1926090"/>
-              <a:ext cx="629735" cy="216109"/>
-            </a:xfrm>
-            <a:prstGeom prst="rect">
-              <a:avLst/>
-            </a:prstGeom>
-            <a:ln>
-              <a:solidFill>
-                <a:schemeClr val="tx1"/>
-              </a:solidFill>
-              <a:prstDash val="solid"/>
-            </a:ln>
-          </p:spPr>
-          <p:style>
-            <a:lnRef idx="2">
-              <a:schemeClr val="accent6"/>
-            </a:lnRef>
-            <a:fillRef idx="1">
-              <a:schemeClr val="lt1"/>
-            </a:fillRef>
-            <a:effectRef idx="0">
-              <a:schemeClr val="accent6"/>
-            </a:effectRef>
-            <a:fontRef idx="minor">
-              <a:schemeClr val="dk1"/>
-            </a:fontRef>
-          </p:style>
-          <p:txBody>
-            <a:bodyPr rtlCol="0" anchor="ctr"/>
-            <a:lstStyle/>
-            <a:p>
-              <a:pPr algn="ctr"/>
-              <a:r>
-                <a:rPr lang="en-US" altLang="zh-CN" dirty="0"/>
-                <a:t>AST</a:t>
-              </a:r>
-              <a:endParaRPr lang="zh-CN" altLang="en-US" dirty="0"/>
-            </a:p>
-          </p:txBody>
-        </p:sp>
-      </p:grpSp>
-      <p:grpSp>
-        <p:nvGrpSpPr>
-          <p:cNvPr id="113" name="组合 112"/>
-          <p:cNvGrpSpPr/>
-          <p:nvPr/>
-        </p:nvGrpSpPr>
-        <p:grpSpPr>
-          <a:xfrm>
-            <a:off x="8950325" y="4488815"/>
-            <a:ext cx="1726565" cy="1002030"/>
-            <a:chOff x="5753216" y="3214821"/>
-            <a:chExt cx="1349318" cy="693475"/>
-          </a:xfrm>
-        </p:grpSpPr>
-        <p:sp>
-          <p:nvSpPr>
-            <p:cNvPr id="152" name="流程图: 可选过程 151"/>
-            <p:cNvSpPr/>
-            <p:nvPr/>
-          </p:nvSpPr>
-          <p:spPr>
-            <a:xfrm>
-              <a:off x="5753216" y="3214821"/>
-              <a:ext cx="1349318" cy="693475"/>
-            </a:xfrm>
-            <a:prstGeom prst="flowChartAlternateProcess">
-              <a:avLst/>
-            </a:prstGeom>
-            <a:solidFill>
-              <a:schemeClr val="accent4">
-                <a:lumMod val="20000"/>
-                <a:lumOff val="80000"/>
-              </a:schemeClr>
-            </a:solidFill>
-          </p:spPr>
-          <p:style>
-            <a:lnRef idx="2">
-              <a:schemeClr val="accent6"/>
-            </a:lnRef>
-            <a:fillRef idx="1">
-              <a:schemeClr val="lt1"/>
-            </a:fillRef>
-            <a:effectRef idx="0">
-              <a:schemeClr val="accent6"/>
-            </a:effectRef>
-            <a:fontRef idx="minor">
-              <a:schemeClr val="dk1"/>
-            </a:fontRef>
-          </p:style>
-          <p:txBody>
-            <a:bodyPr rtlCol="0" anchor="ctr"/>
-            <a:lstStyle/>
-            <a:p>
-              <a:pPr algn="ctr"/>
-              <a:br>
-                <a:rPr lang="en-US" altLang="zh-CN" dirty="0">
-                  <a:sym typeface="+mn-ea"/>
-                </a:rPr>
-              </a:br>
-              <a:r>
-                <a:rPr lang="en-US" altLang="zh-CN" dirty="0">
-                  <a:sym typeface="+mn-ea"/>
-                </a:rPr>
-                <a:t>Propagate </a:t>
-              </a:r>
-              <a:br>
-                <a:rPr lang="en-US" altLang="zh-CN" dirty="0">
-                  <a:sym typeface="+mn-ea"/>
-                </a:rPr>
-              </a:br>
-              <a:r>
-                <a:rPr lang="en-US" altLang="zh-CN" dirty="0">
-                  <a:sym typeface="+mn-ea"/>
-                </a:rPr>
-                <a:t>locking policy</a:t>
-              </a:r>
-              <a:endParaRPr lang="en-US" altLang="zh-CN" dirty="0"/>
-            </a:p>
-          </p:txBody>
-        </p:sp>
-        <p:sp>
-          <p:nvSpPr>
-            <p:cNvPr id="23" name="矩形 22"/>
-            <p:cNvSpPr/>
-            <p:nvPr/>
-          </p:nvSpPr>
-          <p:spPr>
-            <a:xfrm>
-              <a:off x="6089507" y="3260461"/>
-              <a:ext cx="690337" cy="200549"/>
-            </a:xfrm>
-            <a:prstGeom prst="rect">
-              <a:avLst/>
-            </a:prstGeom>
-            <a:ln>
-              <a:solidFill>
-                <a:schemeClr val="tx1"/>
-              </a:solidFill>
-            </a:ln>
-          </p:spPr>
-          <p:style>
-            <a:lnRef idx="2">
-              <a:schemeClr val="accent6"/>
-            </a:lnRef>
-            <a:fillRef idx="1">
-              <a:schemeClr val="lt1"/>
-            </a:fillRef>
-            <a:effectRef idx="0">
-              <a:schemeClr val="accent6"/>
-            </a:effectRef>
-            <a:fontRef idx="minor">
-              <a:schemeClr val="dk1"/>
-            </a:fontRef>
-          </p:style>
-          <p:txBody>
-            <a:bodyPr rtlCol="0" anchor="ctr"/>
-            <a:lstStyle/>
-            <a:p>
-              <a:pPr algn="ctr"/>
-              <a:r>
-                <a:rPr lang="en-US" altLang="zh-CN" dirty="0">
-                  <a:ln w="0"/>
-                  <a:effectLst>
-                    <a:outerShdw blurRad="38100" dist="19050" dir="2700000" algn="tl" rotWithShape="0">
-                      <a:schemeClr val="dk1">
-                        <a:alpha val="40000"/>
-                      </a:schemeClr>
-                    </a:outerShdw>
-                  </a:effectLst>
-                </a:rPr>
-                <a:t>AST</a:t>
-              </a:r>
-              <a:endParaRPr lang="en-US" altLang="zh-CN" dirty="0">
-                <a:ln w="0"/>
-                <a:effectLst>
-                  <a:outerShdw blurRad="38100" dist="19050" dir="2700000" algn="tl" rotWithShape="0">
-                    <a:schemeClr val="dk1">
-                      <a:alpha val="40000"/>
-                    </a:schemeClr>
-                  </a:outerShdw>
-                </a:effectLst>
-              </a:endParaRPr>
-            </a:p>
-          </p:txBody>
-        </p:sp>
-      </p:grpSp>
-      <p:grpSp>
-        <p:nvGrpSpPr>
-          <p:cNvPr id="80" name="组合 79"/>
-          <p:cNvGrpSpPr/>
-          <p:nvPr/>
-        </p:nvGrpSpPr>
-        <p:grpSpPr>
-          <a:xfrm>
-            <a:off x="6271260" y="4504690"/>
-            <a:ext cx="2346960" cy="963930"/>
-            <a:chOff x="5986768" y="4336388"/>
-            <a:chExt cx="2272632" cy="515219"/>
-          </a:xfrm>
-        </p:grpSpPr>
-        <p:sp>
-          <p:nvSpPr>
-            <p:cNvPr id="145" name="流程图: 可选过程 144"/>
-            <p:cNvSpPr/>
-            <p:nvPr/>
-          </p:nvSpPr>
-          <p:spPr>
-            <a:xfrm>
-              <a:off x="5986768" y="4336388"/>
-              <a:ext cx="2272632" cy="515219"/>
-            </a:xfrm>
-            <a:prstGeom prst="flowChartAlternateProcess">
-              <a:avLst/>
-            </a:prstGeom>
-            <a:solidFill>
-              <a:schemeClr val="accent4">
-                <a:lumMod val="20000"/>
-                <a:lumOff val="80000"/>
-              </a:schemeClr>
-            </a:solidFill>
-          </p:spPr>
-          <p:style>
-            <a:lnRef idx="2">
-              <a:schemeClr val="accent6"/>
-            </a:lnRef>
-            <a:fillRef idx="1">
-              <a:schemeClr val="lt1"/>
-            </a:fillRef>
-            <a:effectRef idx="0">
-              <a:schemeClr val="accent6"/>
-            </a:effectRef>
-            <a:fontRef idx="minor">
-              <a:schemeClr val="dk1"/>
-            </a:fontRef>
-          </p:style>
-          <p:txBody>
-            <a:bodyPr rtlCol="0" anchor="ctr"/>
-            <a:lstStyle/>
-            <a:p>
-              <a:pPr algn="ctr"/>
-              <a:br>
-                <a:rPr lang="en-US" altLang="zh-CN" dirty="0">
-                  <a:sym typeface="+mn-ea"/>
-                </a:rPr>
-              </a:br>
-              <a:r>
-                <a:rPr lang="en-US" altLang="zh-CN" dirty="0">
-                  <a:sym typeface="+mn-ea"/>
-                </a:rPr>
-                <a:t>Remove redundant locking</a:t>
-              </a:r>
-              <a:endParaRPr lang="en-US" altLang="zh-CN" dirty="0"/>
-            </a:p>
-          </p:txBody>
-        </p:sp>
-        <p:grpSp>
-          <p:nvGrpSpPr>
-            <p:cNvPr id="75" name="组合 74"/>
-            <p:cNvGrpSpPr/>
-            <p:nvPr/>
-          </p:nvGrpSpPr>
-          <p:grpSpPr>
-            <a:xfrm>
-              <a:off x="6301692" y="4360386"/>
-              <a:ext cx="1737939" cy="178507"/>
-              <a:chOff x="6285995" y="4333104"/>
-              <a:chExt cx="1710990" cy="178467"/>
-            </a:xfrm>
-          </p:grpSpPr>
-          <p:sp>
-            <p:nvSpPr>
-              <p:cNvPr id="11" name="矩形 10"/>
-              <p:cNvSpPr/>
-              <p:nvPr/>
-            </p:nvSpPr>
-            <p:spPr>
-              <a:xfrm>
-                <a:off x="6285995" y="4333104"/>
-                <a:ext cx="680642" cy="178467"/>
-              </a:xfrm>
-              <a:prstGeom prst="rect">
-                <a:avLst/>
-              </a:prstGeom>
-              <a:ln>
-                <a:solidFill>
-                  <a:schemeClr val="tx1"/>
-                </a:solidFill>
-              </a:ln>
-            </p:spPr>
-            <p:style>
-              <a:lnRef idx="2">
-                <a:schemeClr val="accent6"/>
-              </a:lnRef>
-              <a:fillRef idx="1">
-                <a:schemeClr val="lt1"/>
-              </a:fillRef>
-              <a:effectRef idx="0">
-                <a:schemeClr val="accent6"/>
-              </a:effectRef>
-              <a:fontRef idx="minor">
-                <a:schemeClr val="dk1"/>
-              </a:fontRef>
-            </p:style>
-            <p:txBody>
-              <a:bodyPr rtlCol="0" anchor="ctr"/>
-              <a:lstStyle/>
-              <a:p>
-                <a:pPr algn="ctr"/>
-                <a:r>
-                  <a:rPr lang="en-US" altLang="zh-CN" dirty="0">
-                    <a:ln w="0"/>
-                    <a:effectLst>
-                      <a:outerShdw blurRad="38100" dist="19050" dir="2700000" algn="tl" rotWithShape="0">
-                        <a:schemeClr val="dk1">
-                          <a:alpha val="40000"/>
-                        </a:schemeClr>
-                      </a:outerShdw>
-                    </a:effectLst>
-                  </a:rPr>
-                  <a:t>JPF</a:t>
-                </a:r>
-                <a:endParaRPr lang="en-US" altLang="zh-CN" dirty="0">
-                  <a:ln w="0"/>
-                  <a:effectLst>
-                    <a:outerShdw blurRad="38100" dist="19050" dir="2700000" algn="tl" rotWithShape="0">
-                      <a:schemeClr val="dk1">
-                        <a:alpha val="40000"/>
-                      </a:schemeClr>
-                    </a:outerShdw>
-                  </a:effectLst>
-                </a:endParaRPr>
-              </a:p>
-            </p:txBody>
-          </p:sp>
-          <p:sp>
-            <p:nvSpPr>
-              <p:cNvPr id="25" name="矩形 24"/>
-              <p:cNvSpPr/>
-              <p:nvPr/>
-            </p:nvSpPr>
-            <p:spPr>
-              <a:xfrm>
-                <a:off x="7217305" y="4337293"/>
-                <a:ext cx="779680" cy="172321"/>
-              </a:xfrm>
-              <a:prstGeom prst="rect">
-                <a:avLst/>
-              </a:prstGeom>
-              <a:ln>
-                <a:solidFill>
-                  <a:schemeClr val="tx1"/>
-                </a:solidFill>
-              </a:ln>
-            </p:spPr>
-            <p:style>
-              <a:lnRef idx="2">
-                <a:schemeClr val="accent6"/>
-              </a:lnRef>
-              <a:fillRef idx="1">
-                <a:schemeClr val="lt1"/>
-              </a:fillRef>
-              <a:effectRef idx="0">
-                <a:schemeClr val="accent6"/>
-              </a:effectRef>
-              <a:fontRef idx="minor">
-                <a:schemeClr val="dk1"/>
-              </a:fontRef>
-            </p:style>
-            <p:txBody>
-              <a:bodyPr rtlCol="0" anchor="ctr"/>
-              <a:lstStyle/>
-              <a:p>
-                <a:pPr algn="ctr"/>
-                <a:r>
-                  <a:rPr lang="en-US" altLang="zh-CN" dirty="0">
-                    <a:ln w="0"/>
-                    <a:effectLst>
-                      <a:outerShdw blurRad="38100" dist="19050" dir="2700000" algn="tl" rotWithShape="0">
-                        <a:schemeClr val="dk1">
-                          <a:alpha val="40000"/>
-                        </a:schemeClr>
-                      </a:outerShdw>
-                    </a:effectLst>
-                  </a:rPr>
-                  <a:t>AST</a:t>
-                </a:r>
-                <a:endParaRPr lang="en-US" altLang="zh-CN" dirty="0">
-                  <a:ln w="0"/>
-                  <a:effectLst>
-                    <a:outerShdw blurRad="38100" dist="19050" dir="2700000" algn="tl" rotWithShape="0">
-                      <a:schemeClr val="dk1">
-                        <a:alpha val="40000"/>
-                      </a:schemeClr>
-                    </a:outerShdw>
-                  </a:effectLst>
-                </a:endParaRPr>
-              </a:p>
-            </p:txBody>
-          </p:sp>
-        </p:grpSp>
-      </p:grpSp>
-      <p:grpSp>
-        <p:nvGrpSpPr>
-          <p:cNvPr id="64" name="组合 63"/>
-          <p:cNvGrpSpPr/>
-          <p:nvPr/>
-        </p:nvGrpSpPr>
-        <p:grpSpPr>
-          <a:xfrm>
-            <a:off x="1470025" y="4353560"/>
-            <a:ext cx="3190240" cy="1591310"/>
-            <a:chOff x="1482223" y="3429081"/>
-            <a:chExt cx="1784501" cy="627351"/>
-          </a:xfrm>
-          <a:solidFill>
-            <a:srgbClr val="E2F0D9"/>
-          </a:solidFill>
-        </p:grpSpPr>
-        <p:sp>
-          <p:nvSpPr>
-            <p:cNvPr id="156" name="流程图: 可选过程 155"/>
-            <p:cNvSpPr/>
-            <p:nvPr/>
-          </p:nvSpPr>
-          <p:spPr>
-            <a:xfrm>
-              <a:off x="1482223" y="3429081"/>
-              <a:ext cx="1784501" cy="627351"/>
-            </a:xfrm>
-            <a:prstGeom prst="flowChartAlternateProcess">
-              <a:avLst/>
-            </a:prstGeom>
-            <a:grpFill/>
-            <a:ln>
-              <a:solidFill>
-                <a:srgbClr val="5B9BD5"/>
-              </a:solidFill>
-            </a:ln>
-          </p:spPr>
-          <p:style>
-            <a:lnRef idx="2">
-              <a:schemeClr val="accent6"/>
-            </a:lnRef>
-            <a:fillRef idx="1">
-              <a:schemeClr val="lt1"/>
-            </a:fillRef>
-            <a:effectRef idx="0">
-              <a:schemeClr val="accent6"/>
-            </a:effectRef>
-            <a:fontRef idx="minor">
-              <a:schemeClr val="dk1"/>
-            </a:fontRef>
-          </p:style>
-          <p:txBody>
-            <a:bodyPr rtlCol="0" anchor="ctr"/>
-            <a:lstStyle/>
-            <a:p>
-              <a:pPr algn="ctr"/>
-              <a:endParaRPr lang="en-US" altLang="zh-CN" dirty="0">
-                <a:sym typeface="+mn-ea"/>
-              </a:endParaRPr>
-            </a:p>
-            <a:p>
-              <a:pPr algn="ctr"/>
-              <a:endParaRPr lang="en-US" altLang="zh-CN" dirty="0">
-                <a:sym typeface="+mn-ea"/>
-              </a:endParaRPr>
-            </a:p>
-            <a:p>
-              <a:pPr algn="ctr"/>
-              <a:r>
-                <a:rPr lang="en-US" altLang="zh-CN" b="1" dirty="0">
-                  <a:sym typeface="+mn-ea"/>
-                </a:rPr>
-                <a:t>Step 5: Test Fixed Program</a:t>
+                <a:t>Step 5: Test the Fixed Program</a:t>
               </a:r>
               <a:endParaRPr lang="en-US" altLang="zh-CN" b="1" dirty="0"/>
             </a:p>

</xml_diff>